<commit_message>
journal figures are updated, the story of the journal is changed.
</commit_message>
<xml_diff>
--- a/Presentation/2021.03.14.pptx
+++ b/Presentation/2021.03.14.pptx
@@ -266,7 +266,7 @@
           <a:p>
             <a:fld id="{8E5F0B77-5064-4363-A7E5-FF390C19CD73}" type="datetimeFigureOut">
               <a:rPr lang="en-US" smtClean="0"/>
-              <a:t>3/14/2021</a:t>
+              <a:t>3/15/2021</a:t>
             </a:fld>
             <a:endParaRPr lang="en-US"/>
           </a:p>
@@ -464,7 +464,7 @@
           <a:p>
             <a:fld id="{8E5F0B77-5064-4363-A7E5-FF390C19CD73}" type="datetimeFigureOut">
               <a:rPr lang="en-US" smtClean="0"/>
-              <a:t>3/14/2021</a:t>
+              <a:t>3/15/2021</a:t>
             </a:fld>
             <a:endParaRPr lang="en-US"/>
           </a:p>
@@ -672,7 +672,7 @@
           <a:p>
             <a:fld id="{8E5F0B77-5064-4363-A7E5-FF390C19CD73}" type="datetimeFigureOut">
               <a:rPr lang="en-US" smtClean="0"/>
-              <a:t>3/14/2021</a:t>
+              <a:t>3/15/2021</a:t>
             </a:fld>
             <a:endParaRPr lang="en-US"/>
           </a:p>
@@ -870,7 +870,7 @@
           <a:p>
             <a:fld id="{8E5F0B77-5064-4363-A7E5-FF390C19CD73}" type="datetimeFigureOut">
               <a:rPr lang="en-US" smtClean="0"/>
-              <a:t>3/14/2021</a:t>
+              <a:t>3/15/2021</a:t>
             </a:fld>
             <a:endParaRPr lang="en-US"/>
           </a:p>
@@ -1145,7 +1145,7 @@
           <a:p>
             <a:fld id="{8E5F0B77-5064-4363-A7E5-FF390C19CD73}" type="datetimeFigureOut">
               <a:rPr lang="en-US" smtClean="0"/>
-              <a:t>3/14/2021</a:t>
+              <a:t>3/15/2021</a:t>
             </a:fld>
             <a:endParaRPr lang="en-US"/>
           </a:p>
@@ -1410,7 +1410,7 @@
           <a:p>
             <a:fld id="{8E5F0B77-5064-4363-A7E5-FF390C19CD73}" type="datetimeFigureOut">
               <a:rPr lang="en-US" smtClean="0"/>
-              <a:t>3/14/2021</a:t>
+              <a:t>3/15/2021</a:t>
             </a:fld>
             <a:endParaRPr lang="en-US"/>
           </a:p>
@@ -1822,7 +1822,7 @@
           <a:p>
             <a:fld id="{8E5F0B77-5064-4363-A7E5-FF390C19CD73}" type="datetimeFigureOut">
               <a:rPr lang="en-US" smtClean="0"/>
-              <a:t>3/14/2021</a:t>
+              <a:t>3/15/2021</a:t>
             </a:fld>
             <a:endParaRPr lang="en-US"/>
           </a:p>
@@ -1963,7 +1963,7 @@
           <a:p>
             <a:fld id="{8E5F0B77-5064-4363-A7E5-FF390C19CD73}" type="datetimeFigureOut">
               <a:rPr lang="en-US" smtClean="0"/>
-              <a:t>3/14/2021</a:t>
+              <a:t>3/15/2021</a:t>
             </a:fld>
             <a:endParaRPr lang="en-US"/>
           </a:p>
@@ -2076,7 +2076,7 @@
           <a:p>
             <a:fld id="{8E5F0B77-5064-4363-A7E5-FF390C19CD73}" type="datetimeFigureOut">
               <a:rPr lang="en-US" smtClean="0"/>
-              <a:t>3/14/2021</a:t>
+              <a:t>3/15/2021</a:t>
             </a:fld>
             <a:endParaRPr lang="en-US"/>
           </a:p>
@@ -2387,7 +2387,7 @@
           <a:p>
             <a:fld id="{8E5F0B77-5064-4363-A7E5-FF390C19CD73}" type="datetimeFigureOut">
               <a:rPr lang="en-US" smtClean="0"/>
-              <a:t>3/14/2021</a:t>
+              <a:t>3/15/2021</a:t>
             </a:fld>
             <a:endParaRPr lang="en-US"/>
           </a:p>
@@ -2675,7 +2675,7 @@
           <a:p>
             <a:fld id="{8E5F0B77-5064-4363-A7E5-FF390C19CD73}" type="datetimeFigureOut">
               <a:rPr lang="en-US" smtClean="0"/>
-              <a:t>3/14/2021</a:t>
+              <a:t>3/15/2021</a:t>
             </a:fld>
             <a:endParaRPr lang="en-US"/>
           </a:p>
@@ -2916,7 +2916,7 @@
           <a:p>
             <a:fld id="{8E5F0B77-5064-4363-A7E5-FF390C19CD73}" type="datetimeFigureOut">
               <a:rPr lang="en-US" smtClean="0"/>
-              <a:t>3/14/2021</a:t>
+              <a:t>3/15/2021</a:t>
             </a:fld>
             <a:endParaRPr lang="en-US"/>
           </a:p>
@@ -3842,7 +3842,7 @@
                     <a:latin typeface="Times New Roman" panose="02020603050405020304" pitchFamily="18" charset="0"/>
                     <a:cs typeface="Times New Roman" panose="02020603050405020304" pitchFamily="18" charset="0"/>
                   </a:rPr>
-                  <a:t>=&gt; </a:t>
+                  <a:t> =&gt; </a:t>
                 </a:r>
                 <a:r>
                   <a:rPr lang="en-US" sz="1600" dirty="0">
@@ -4031,7 +4031,7 @@
                     <a:latin typeface="Times New Roman" panose="02020603050405020304" pitchFamily="18" charset="0"/>
                     <a:cs typeface="Times New Roman" panose="02020603050405020304" pitchFamily="18" charset="0"/>
                   </a:rPr>
-                  <a:t>=&gt;</a:t>
+                  <a:t> =&gt;</a:t>
                 </a:r>
                 <a:r>
                   <a:rPr lang="en-US" sz="1600" dirty="0">
@@ -4091,7 +4091,7 @@
                     <a:latin typeface="Times New Roman" panose="02020603050405020304" pitchFamily="18" charset="0"/>
                     <a:cs typeface="Times New Roman" panose="02020603050405020304" pitchFamily="18" charset="0"/>
                   </a:rPr>
-                  <a:t>=&gt;</a:t>
+                  <a:t> =&gt;</a:t>
                 </a:r>
                 <a:r>
                   <a:rPr lang="en-US" sz="1600" dirty="0">
@@ -4196,8 +4196,8 @@
           </a:fontRef>
         </p:style>
       </p:cxnSp>
-      <mc:AlternateContent xmlns:mc="http://schemas.openxmlformats.org/markup-compatibility/2006">
-        <mc:Choice xmlns:a14="http://schemas.microsoft.com/office/drawing/2010/main" Requires="a14">
+      <mc:AlternateContent xmlns:mc="http://schemas.openxmlformats.org/markup-compatibility/2006" xmlns:a14="http://schemas.microsoft.com/office/drawing/2010/main">
+        <mc:Choice Requires="a14">
           <p:sp>
             <p:nvSpPr>
               <p:cNvPr id="24" name="TextBox 23">
@@ -4279,7 +4279,7 @@
             </p:txBody>
           </p:sp>
         </mc:Choice>
-        <mc:Fallback>
+        <mc:Fallback xmlns="">
           <p:sp>
             <p:nvSpPr>
               <p:cNvPr id="24" name="TextBox 23">
@@ -4324,8 +4324,8 @@
           </p:sp>
         </mc:Fallback>
       </mc:AlternateContent>
-      <mc:AlternateContent xmlns:mc="http://schemas.openxmlformats.org/markup-compatibility/2006">
-        <mc:Choice xmlns:a14="http://schemas.microsoft.com/office/drawing/2010/main" Requires="a14">
+      <mc:AlternateContent xmlns:mc="http://schemas.openxmlformats.org/markup-compatibility/2006" xmlns:a14="http://schemas.microsoft.com/office/drawing/2010/main">
+        <mc:Choice Requires="a14">
           <p:sp>
             <p:nvSpPr>
               <p:cNvPr id="26" name="TextBox 25">
@@ -4382,7 +4382,7 @@
             </p:txBody>
           </p:sp>
         </mc:Choice>
-        <mc:Fallback>
+        <mc:Fallback xmlns="">
           <p:sp>
             <p:nvSpPr>
               <p:cNvPr id="26" name="TextBox 25">
@@ -4749,8 +4749,8 @@
           </a:p>
         </p:txBody>
       </p:sp>
-      <mc:AlternateContent xmlns:mc="http://schemas.openxmlformats.org/markup-compatibility/2006">
-        <mc:Choice xmlns:a14="http://schemas.microsoft.com/office/drawing/2010/main" Requires="a14">
+      <mc:AlternateContent xmlns:mc="http://schemas.openxmlformats.org/markup-compatibility/2006" xmlns:a14="http://schemas.microsoft.com/office/drawing/2010/main">
+        <mc:Choice Requires="a14">
           <p:graphicFrame>
             <p:nvGraphicFramePr>
               <p:cNvPr id="8" name="Table 7">
@@ -5086,6 +5086,7 @@
                         <a:bodyPr/>
                         <a:lstStyle/>
                         <a:p>
+                          <a:pPr/>
                           <a14:m>
                             <m:oMathPara xmlns:m="http://schemas.openxmlformats.org/officeDocument/2006/math">
                               <m:oMathParaPr>
@@ -5326,6 +5327,7 @@
                         <a:bodyPr/>
                         <a:lstStyle/>
                         <a:p>
+                          <a:pPr/>
                           <a14:m>
                             <m:oMathPara xmlns:m="http://schemas.openxmlformats.org/officeDocument/2006/math">
                               <m:oMathParaPr>
@@ -5477,6 +5479,7 @@
                         <a:bodyPr/>
                         <a:lstStyle/>
                         <a:p>
+                          <a:pPr/>
                           <a14:m>
                             <m:oMathPara xmlns:m="http://schemas.openxmlformats.org/officeDocument/2006/math">
                               <m:oMathParaPr>
@@ -5626,6 +5629,7 @@
                         <a:bodyPr/>
                         <a:lstStyle/>
                         <a:p>
+                          <a:pPr/>
                           <a14:m>
                             <m:oMathPara xmlns:m="http://schemas.openxmlformats.org/officeDocument/2006/math">
                               <m:oMathParaPr>
@@ -5773,6 +5777,7 @@
                         <a:bodyPr/>
                         <a:lstStyle/>
                         <a:p>
+                          <a:pPr/>
                           <a14:m>
                             <m:oMathPara xmlns:m="http://schemas.openxmlformats.org/officeDocument/2006/math">
                               <m:oMathParaPr>
@@ -5875,6 +5880,7 @@
                         <a:bodyPr/>
                         <a:lstStyle/>
                         <a:p>
+                          <a:pPr/>
                           <a14:m>
                             <m:oMathPara xmlns:m="http://schemas.openxmlformats.org/officeDocument/2006/math">
                               <m:oMathParaPr>
@@ -5977,6 +5983,7 @@
                         <a:bodyPr/>
                         <a:lstStyle/>
                         <a:p>
+                          <a:pPr/>
                           <a14:m>
                             <m:oMathPara xmlns:m="http://schemas.openxmlformats.org/officeDocument/2006/math">
                               <m:oMathParaPr>
@@ -6004,17 +6011,7 @@
                                         <a:latin typeface="Cambria Math" panose="02040503050406030204" pitchFamily="18" charset="0"/>
                                         <a:cs typeface="Times New Roman" panose="02020603050405020304" pitchFamily="18" charset="0"/>
                                       </a:rPr>
-                                      <m:t>1</m:t>
-                                    </m:r>
-                                    <m:r>
-                                      <a:rPr lang="en-US" sz="1600" b="0" i="1" dirty="0" smtClean="0">
-                                        <a:solidFill>
-                                          <a:sysClr val="windowText" lastClr="000000"/>
-                                        </a:solidFill>
-                                        <a:latin typeface="Cambria Math" panose="02040503050406030204" pitchFamily="18" charset="0"/>
-                                        <a:cs typeface="Times New Roman" panose="02020603050405020304" pitchFamily="18" charset="0"/>
-                                      </a:rPr>
-                                      <m:t>20</m:t>
+                                      <m:t>120</m:t>
                                     </m:r>
                                   </m:e>
                                   <m:sup>
@@ -6096,6 +6093,7 @@
                         <a:bodyPr/>
                         <a:lstStyle/>
                         <a:p>
+                          <a:pPr/>
                           <a14:m>
                             <m:oMathPara xmlns:m="http://schemas.openxmlformats.org/officeDocument/2006/math">
                               <m:oMathParaPr>
@@ -6147,17 +6145,7 @@
                                     <a:latin typeface="Cambria Math" panose="02040503050406030204" pitchFamily="18" charset="0"/>
                                     <a:cs typeface="Times New Roman" panose="02020603050405020304" pitchFamily="18" charset="0"/>
                                   </a:rPr>
-                                  <m:t>−</m:t>
-                                </m:r>
-                                <m:r>
-                                  <a:rPr lang="en-US" sz="1600" b="0" i="1" smtClean="0">
-                                    <a:solidFill>
-                                      <a:sysClr val="windowText" lastClr="000000"/>
-                                    </a:solidFill>
-                                    <a:latin typeface="Cambria Math" panose="02040503050406030204" pitchFamily="18" charset="0"/>
-                                    <a:cs typeface="Times New Roman" panose="02020603050405020304" pitchFamily="18" charset="0"/>
-                                  </a:rPr>
-                                  <m:t>2</m:t>
+                                  <m:t>−2</m:t>
                                 </m:r>
                                 <m:sSub>
                                   <m:sSubPr>
@@ -6253,6 +6241,7 @@
                         <a:bodyPr/>
                         <a:lstStyle/>
                         <a:p>
+                          <a:pPr/>
                           <a14:m>
                             <m:oMathPara xmlns:m="http://schemas.openxmlformats.org/officeDocument/2006/math">
                               <m:oMathParaPr>
@@ -6355,6 +6344,7 @@
                         <a:bodyPr/>
                         <a:lstStyle/>
                         <a:p>
+                          <a:pPr/>
                           <a14:m>
                             <m:oMathPara xmlns:m="http://schemas.openxmlformats.org/officeDocument/2006/math">
                               <m:oMathParaPr>
@@ -6457,6 +6447,7 @@
                         <a:bodyPr/>
                         <a:lstStyle/>
                         <a:p>
+                          <a:pPr/>
                           <a14:m>
                             <m:oMathPara xmlns:m="http://schemas.openxmlformats.org/officeDocument/2006/math">
                               <m:oMathParaPr>
@@ -6484,17 +6475,7 @@
                                         <a:latin typeface="Cambria Math" panose="02040503050406030204" pitchFamily="18" charset="0"/>
                                         <a:cs typeface="Times New Roman" panose="02020603050405020304" pitchFamily="18" charset="0"/>
                                       </a:rPr>
-                                      <m:t>6</m:t>
-                                    </m:r>
-                                    <m:r>
-                                      <a:rPr lang="en-US" sz="1600" b="0" i="1" dirty="0" smtClean="0">
-                                        <a:solidFill>
-                                          <a:sysClr val="windowText" lastClr="000000"/>
-                                        </a:solidFill>
-                                        <a:latin typeface="Cambria Math" panose="02040503050406030204" pitchFamily="18" charset="0"/>
-                                        <a:cs typeface="Times New Roman" panose="02020603050405020304" pitchFamily="18" charset="0"/>
-                                      </a:rPr>
-                                      <m:t>0</m:t>
+                                      <m:t>60</m:t>
                                     </m:r>
                                   </m:e>
                                   <m:sup>
@@ -6576,6 +6557,7 @@
                         <a:bodyPr/>
                         <a:lstStyle/>
                         <a:p>
+                          <a:pPr/>
                           <a14:m>
                             <m:oMathPara xmlns:m="http://schemas.openxmlformats.org/officeDocument/2006/math">
                               <m:oMathParaPr>
@@ -6676,6 +6658,7 @@
                         <a:bodyPr/>
                         <a:lstStyle/>
                         <a:p>
+                          <a:pPr/>
                           <a14:m>
                             <m:oMathPara xmlns:m="http://schemas.openxmlformats.org/officeDocument/2006/math">
                               <m:oMathParaPr>
@@ -6778,6 +6761,7 @@
                         <a:bodyPr/>
                         <a:lstStyle/>
                         <a:p>
+                          <a:pPr/>
                           <a14:m>
                             <m:oMathPara xmlns:m="http://schemas.openxmlformats.org/officeDocument/2006/math">
                               <m:oMathParaPr>
@@ -6880,6 +6864,7 @@
                         <a:bodyPr/>
                         <a:lstStyle/>
                         <a:p>
+                          <a:pPr/>
                           <a14:m>
                             <m:oMathPara xmlns:m="http://schemas.openxmlformats.org/officeDocument/2006/math">
                               <m:oMathParaPr>
@@ -6989,6 +6974,7 @@
                         <a:bodyPr/>
                         <a:lstStyle/>
                         <a:p>
+                          <a:pPr/>
                           <a14:m>
                             <m:oMathPara xmlns:m="http://schemas.openxmlformats.org/officeDocument/2006/math">
                               <m:oMathParaPr>
@@ -7040,17 +7026,7 @@
                                     <a:latin typeface="Cambria Math" panose="02040503050406030204" pitchFamily="18" charset="0"/>
                                     <a:cs typeface="Times New Roman" panose="02020603050405020304" pitchFamily="18" charset="0"/>
                                   </a:rPr>
-                                  <m:t>+</m:t>
-                                </m:r>
-                                <m:r>
-                                  <a:rPr lang="en-US" sz="1600" b="0" i="1" smtClean="0">
-                                    <a:solidFill>
-                                      <a:sysClr val="windowText" lastClr="000000"/>
-                                    </a:solidFill>
-                                    <a:latin typeface="Cambria Math" panose="02040503050406030204" pitchFamily="18" charset="0"/>
-                                    <a:cs typeface="Times New Roman" panose="02020603050405020304" pitchFamily="18" charset="0"/>
-                                  </a:rPr>
-                                  <m:t>2</m:t>
+                                  <m:t>+2</m:t>
                                 </m:r>
                                 <m:sSub>
                                   <m:sSubPr>
@@ -7146,6 +7122,7 @@
                         <a:bodyPr/>
                         <a:lstStyle/>
                         <a:p>
+                          <a:pPr/>
                           <a14:m>
                             <m:oMathPara xmlns:m="http://schemas.openxmlformats.org/officeDocument/2006/math">
                               <m:oMathParaPr>
@@ -7248,6 +7225,7 @@
                         <a:bodyPr/>
                         <a:lstStyle/>
                         <a:p>
+                          <a:pPr/>
                           <a14:m>
                             <m:oMathPara xmlns:m="http://schemas.openxmlformats.org/officeDocument/2006/math">
                               <m:oMathParaPr>
@@ -7275,17 +7253,7 @@
                                         <a:latin typeface="Cambria Math" panose="02040503050406030204" pitchFamily="18" charset="0"/>
                                         <a:cs typeface="Times New Roman" panose="02020603050405020304" pitchFamily="18" charset="0"/>
                                       </a:rPr>
-                                      <m:t>6</m:t>
-                                    </m:r>
-                                    <m:r>
-                                      <a:rPr lang="en-US" sz="1600" b="0" i="1" dirty="0" smtClean="0">
-                                        <a:solidFill>
-                                          <a:sysClr val="windowText" lastClr="000000"/>
-                                        </a:solidFill>
-                                        <a:latin typeface="Cambria Math" panose="02040503050406030204" pitchFamily="18" charset="0"/>
-                                        <a:cs typeface="Times New Roman" panose="02020603050405020304" pitchFamily="18" charset="0"/>
-                                      </a:rPr>
-                                      <m:t>0</m:t>
+                                      <m:t>60</m:t>
                                     </m:r>
                                   </m:e>
                                   <m:sup>
@@ -7360,6 +7328,7 @@
                         <a:bodyPr/>
                         <a:lstStyle/>
                         <a:p>
+                          <a:pPr/>
                           <a14:m>
                             <m:oMathPara xmlns:m="http://schemas.openxmlformats.org/officeDocument/2006/math">
                               <m:oMathParaPr>
@@ -7387,17 +7356,7 @@
                                         <a:latin typeface="Cambria Math" panose="02040503050406030204" pitchFamily="18" charset="0"/>
                                         <a:cs typeface="Times New Roman" panose="02020603050405020304" pitchFamily="18" charset="0"/>
                                       </a:rPr>
-                                      <m:t>30</m:t>
-                                    </m:r>
-                                    <m:r>
-                                      <a:rPr lang="en-US" sz="1600" b="0" i="1" dirty="0" smtClean="0">
-                                        <a:solidFill>
-                                          <a:sysClr val="windowText" lastClr="000000"/>
-                                        </a:solidFill>
-                                        <a:latin typeface="Cambria Math" panose="02040503050406030204" pitchFamily="18" charset="0"/>
-                                        <a:cs typeface="Times New Roman" panose="02020603050405020304" pitchFamily="18" charset="0"/>
-                                      </a:rPr>
-                                      <m:t>0</m:t>
+                                      <m:t>300</m:t>
                                     </m:r>
                                   </m:e>
                                   <m:sup>
@@ -7479,6 +7438,7 @@
                         <a:bodyPr/>
                         <a:lstStyle/>
                         <a:p>
+                          <a:pPr/>
                           <a14:m>
                             <m:oMathPara xmlns:m="http://schemas.openxmlformats.org/officeDocument/2006/math">
                               <m:oMathParaPr>
@@ -7530,17 +7490,7 @@
                                     <a:latin typeface="Cambria Math" panose="02040503050406030204" pitchFamily="18" charset="0"/>
                                     <a:cs typeface="Times New Roman" panose="02020603050405020304" pitchFamily="18" charset="0"/>
                                   </a:rPr>
-                                  <m:t>+</m:t>
-                                </m:r>
-                                <m:r>
-                                  <a:rPr lang="en-US" sz="1600" b="0" i="1" smtClean="0">
-                                    <a:solidFill>
-                                      <a:sysClr val="windowText" lastClr="000000"/>
-                                    </a:solidFill>
-                                    <a:latin typeface="Cambria Math" panose="02040503050406030204" pitchFamily="18" charset="0"/>
-                                    <a:cs typeface="Times New Roman" panose="02020603050405020304" pitchFamily="18" charset="0"/>
-                                  </a:rPr>
-                                  <m:t>4</m:t>
+                                  <m:t>+4</m:t>
                                 </m:r>
                                 <m:sSub>
                                   <m:sSubPr>
@@ -7636,6 +7586,7 @@
                         <a:bodyPr/>
                         <a:lstStyle/>
                         <a:p>
+                          <a:pPr/>
                           <a14:m>
                             <m:oMathPara xmlns:m="http://schemas.openxmlformats.org/officeDocument/2006/math">
                               <m:oMathParaPr>
@@ -7738,6 +7689,7 @@
                         <a:bodyPr/>
                         <a:lstStyle/>
                         <a:p>
+                          <a:pPr/>
                           <a14:m>
                             <m:oMathPara xmlns:m="http://schemas.openxmlformats.org/officeDocument/2006/math">
                               <m:oMathParaPr>
@@ -7765,17 +7717,7 @@
                                         <a:latin typeface="Cambria Math" panose="02040503050406030204" pitchFamily="18" charset="0"/>
                                         <a:cs typeface="Times New Roman" panose="02020603050405020304" pitchFamily="18" charset="0"/>
                                       </a:rPr>
-                                      <m:t>12</m:t>
-                                    </m:r>
-                                    <m:r>
-                                      <a:rPr lang="en-US" sz="1600" b="0" i="1" dirty="0" smtClean="0">
-                                        <a:solidFill>
-                                          <a:sysClr val="windowText" lastClr="000000"/>
-                                        </a:solidFill>
-                                        <a:latin typeface="Cambria Math" panose="02040503050406030204" pitchFamily="18" charset="0"/>
-                                        <a:cs typeface="Times New Roman" panose="02020603050405020304" pitchFamily="18" charset="0"/>
-                                      </a:rPr>
-                                      <m:t>0</m:t>
+                                      <m:t>120</m:t>
                                     </m:r>
                                   </m:e>
                                   <m:sup>
@@ -7850,6 +7792,7 @@
                         <a:bodyPr/>
                         <a:lstStyle/>
                         <a:p>
+                          <a:pPr/>
                           <a14:m>
                             <m:oMathPara xmlns:m="http://schemas.openxmlformats.org/officeDocument/2006/math">
                               <m:oMathParaPr>
@@ -7958,7 +7901,7 @@
             </a:graphic>
           </p:graphicFrame>
         </mc:Choice>
-        <mc:Fallback>
+        <mc:Fallback xmlns="">
           <p:graphicFrame>
             <p:nvGraphicFramePr>
               <p:cNvPr id="8" name="Table 7">

</xml_diff>